<commit_message>
added bar charts for comparassion for wine quality
</commit_message>
<xml_diff>
--- a/Ex2/ex2.pptx
+++ b/Ex2/ex2.pptx
@@ -5,10 +5,10 @@
     <p:sldMasterId id="2147483648" r:id="rId4"/>
   </p:sldMasterIdLst>
   <p:notesMasterIdLst>
-    <p:notesMasterId r:id="rId18"/>
+    <p:notesMasterId r:id="rId19"/>
   </p:notesMasterIdLst>
   <p:handoutMasterIdLst>
-    <p:handoutMasterId r:id="rId19"/>
+    <p:handoutMasterId r:id="rId20"/>
   </p:handoutMasterIdLst>
   <p:sldIdLst>
     <p:sldId id="256" r:id="rId5"/>
@@ -24,6 +24,7 @@
     <p:sldId id="265" r:id="rId15"/>
     <p:sldId id="278" r:id="rId16"/>
     <p:sldId id="272" r:id="rId17"/>
+    <p:sldId id="286" r:id="rId18"/>
   </p:sldIdLst>
   <p:sldSz cx="12192000" cy="6858000"/>
   <p:notesSz cx="6858000" cy="9144000"/>
@@ -6558,6 +6559,109 @@
 </p:sld>
 </file>
 
+<file path=ppt/slides/slide14.xml><?xml version="1.0" encoding="utf-8"?>
+<p:sld xmlns:a="http://schemas.openxmlformats.org/drawingml/2006/main" xmlns:r="http://schemas.openxmlformats.org/officeDocument/2006/relationships" xmlns:p="http://schemas.openxmlformats.org/presentationml/2006/main">
+  <p:cSld>
+    <p:spTree>
+      <p:nvGrpSpPr>
+        <p:cNvPr id="1" name=""/>
+        <p:cNvGrpSpPr/>
+        <p:nvPr/>
+      </p:nvGrpSpPr>
+      <p:grpSpPr>
+        <a:xfrm>
+          <a:off x="0" y="0"/>
+          <a:ext cx="0" cy="0"/>
+          <a:chOff x="0" y="0"/>
+          <a:chExt cx="0" cy="0"/>
+        </a:xfrm>
+      </p:grpSpPr>
+      <p:sp>
+        <p:nvSpPr>
+          <p:cNvPr id="2" name="Title 1">
+            <a:extLst>
+              <a:ext uri="{FF2B5EF4-FFF2-40B4-BE49-F238E27FC236}">
+                <a16:creationId xmlns:a16="http://schemas.microsoft.com/office/drawing/2014/main" id="{84A8723E-0017-4F33-8668-F157FA187AC1}"/>
+              </a:ext>
+            </a:extLst>
+          </p:cNvPr>
+          <p:cNvSpPr>
+            <a:spLocks noGrp="1"/>
+          </p:cNvSpPr>
+          <p:nvPr>
+            <p:ph type="title"/>
+          </p:nvPr>
+        </p:nvSpPr>
+        <p:spPr/>
+        <p:txBody>
+          <a:bodyPr/>
+          <a:lstStyle/>
+          <a:p>
+            <a:r>
+              <a:rPr lang="en-US" dirty="0"/>
+              <a:t>QUESTIONS</a:t>
+            </a:r>
+            <a:endParaRPr lang="de-DE" dirty="0"/>
+          </a:p>
+        </p:txBody>
+      </p:sp>
+      <p:pic>
+        <p:nvPicPr>
+          <p:cNvPr id="4" name="Content Placeholder 3">
+            <a:extLst>
+              <a:ext uri="{FF2B5EF4-FFF2-40B4-BE49-F238E27FC236}">
+                <a16:creationId xmlns:a16="http://schemas.microsoft.com/office/drawing/2014/main" id="{17F866B9-6BEB-43BD-A519-21D66400D3B9}"/>
+              </a:ext>
+            </a:extLst>
+          </p:cNvPr>
+          <p:cNvPicPr>
+            <a:picLocks noGrp="1" noChangeAspect="1"/>
+          </p:cNvPicPr>
+          <p:nvPr>
+            <p:ph idx="1"/>
+          </p:nvPr>
+        </p:nvPicPr>
+        <p:blipFill>
+          <a:blip r:embed="rId2"/>
+          <a:stretch>
+            <a:fillRect/>
+          </a:stretch>
+        </p:blipFill>
+        <p:spPr>
+          <a:xfrm>
+            <a:off x="3874877" y="1522405"/>
+            <a:ext cx="4765270" cy="4750379"/>
+          </a:xfrm>
+          <a:prstGeom prst="rect">
+            <a:avLst/>
+          </a:prstGeom>
+        </p:spPr>
+      </p:pic>
+    </p:spTree>
+    <p:extLst>
+      <p:ext uri="{BB962C8B-B14F-4D97-AF65-F5344CB8AC3E}">
+        <p14:creationId xmlns:p14="http://schemas.microsoft.com/office/powerpoint/2010/main" val="3127413391"/>
+      </p:ext>
+    </p:extLst>
+  </p:cSld>
+  <p:clrMapOvr>
+    <a:masterClrMapping/>
+  </p:clrMapOvr>
+  <mc:AlternateContent xmlns:mc="http://schemas.openxmlformats.org/markup-compatibility/2006" xmlns:p14="http://schemas.microsoft.com/office/powerpoint/2010/main">
+    <mc:Choice Requires="p14">
+      <p:transition spd="med" p14:dur="700">
+        <p:fade/>
+      </p:transition>
+    </mc:Choice>
+    <mc:Fallback xmlns="">
+      <p:transition spd="med">
+        <p:fade/>
+      </p:transition>
+    </mc:Fallback>
+  </mc:AlternateContent>
+</p:sld>
+</file>
+
 <file path=ppt/slides/slide2.xml><?xml version="1.0" encoding="utf-8"?>
 <p:sld xmlns:a="http://schemas.openxmlformats.org/drawingml/2006/main" xmlns:r="http://schemas.openxmlformats.org/officeDocument/2006/relationships" xmlns:p="http://schemas.openxmlformats.org/presentationml/2006/main">
   <p:cSld>
@@ -6624,10 +6728,9 @@
           <a:lstStyle/>
           <a:p>
             <a:r>
-              <a:rPr lang="en-GB" dirty="0" err="1"/>
-              <a:t>Datase</a:t>
-            </a:r>
-            <a:endParaRPr lang="en-GB" dirty="0"/>
+              <a:rPr lang="en-GB" dirty="0"/>
+              <a:t>Dataset</a:t>
+            </a:r>
           </a:p>
           <a:p>
             <a:pPr rtl="0"/>

</xml_diff>

<commit_message>
added visualization for two datasets
</commit_message>
<xml_diff>
--- a/Ex2/ex2.pptx
+++ b/Ex2/ex2.pptx
@@ -5,10 +5,10 @@
     <p:sldMasterId id="2147483648" r:id="rId4"/>
   </p:sldMasterIdLst>
   <p:notesMasterIdLst>
-    <p:notesMasterId r:id="rId19"/>
+    <p:notesMasterId r:id="rId21"/>
   </p:notesMasterIdLst>
   <p:handoutMasterIdLst>
-    <p:handoutMasterId r:id="rId20"/>
+    <p:handoutMasterId r:id="rId22"/>
   </p:handoutMasterIdLst>
   <p:sldIdLst>
     <p:sldId id="256" r:id="rId5"/>
@@ -18,13 +18,15 @@
     <p:sldId id="259" r:id="rId9"/>
     <p:sldId id="275" r:id="rId10"/>
     <p:sldId id="276" r:id="rId11"/>
-    <p:sldId id="269" r:id="rId12"/>
-    <p:sldId id="280" r:id="rId13"/>
+    <p:sldId id="287" r:id="rId12"/>
+    <p:sldId id="269" r:id="rId13"/>
     <p:sldId id="271" r:id="rId14"/>
     <p:sldId id="265" r:id="rId15"/>
-    <p:sldId id="278" r:id="rId16"/>
-    <p:sldId id="272" r:id="rId17"/>
-    <p:sldId id="286" r:id="rId18"/>
+    <p:sldId id="280" r:id="rId16"/>
+    <p:sldId id="278" r:id="rId17"/>
+    <p:sldId id="288" r:id="rId18"/>
+    <p:sldId id="272" r:id="rId19"/>
+    <p:sldId id="286" r:id="rId20"/>
   </p:sldIdLst>
   <p:sldSz cx="12192000" cy="6858000"/>
   <p:notesSz cx="6858000" cy="9144000"/>
@@ -229,7 +231,7 @@
             <a:pPr rtl="0"/>
             <a:fld id="{8F28AB76-B240-4EB5-BBB8-1585E350B0EB}" type="datetime1">
               <a:rPr lang="en-GB" smtClean="0"/>
-              <a:t>09/12/2022</a:t>
+              <a:t>11/12/2022</a:t>
             </a:fld>
             <a:endParaRPr lang="en-GB"/>
           </a:p>
@@ -399,7 +401,7 @@
             <a:pPr rtl="0"/>
             <a:fld id="{E254F394-CA94-44AB-AA5C-030F15B3DF9F}" type="datetime1">
               <a:rPr lang="en-GB" noProof="0" smtClean="0"/>
-              <a:t>09/12/2022</a:t>
+              <a:t>11/12/2022</a:t>
             </a:fld>
             <a:endParaRPr lang="en-GB" noProof="0"/>
           </a:p>
@@ -1397,7 +1399,7 @@
             <a:pPr rtl="0"/>
             <a:fld id="{520D413B-D766-4408-A8E4-D0943F95F6A1}" type="datetime1">
               <a:rPr lang="en-GB" noProof="0" smtClean="0"/>
-              <a:t>09/12/2022</a:t>
+              <a:t>11/12/2022</a:t>
             </a:fld>
             <a:endParaRPr lang="en-GB" noProof="0"/>
           </a:p>
@@ -1694,7 +1696,7 @@
             <a:pPr rtl="0"/>
             <a:fld id="{844ABC67-7F5E-4178-9DFA-02F5BA36DBD3}" type="datetime1">
               <a:rPr lang="en-GB" noProof="0" smtClean="0"/>
-              <a:t>09/12/2022</a:t>
+              <a:t>11/12/2022</a:t>
             </a:fld>
             <a:endParaRPr lang="en-GB" noProof="0"/>
           </a:p>
@@ -1878,7 +1880,7 @@
             <a:pPr rtl="0"/>
             <a:fld id="{AAAFE8D9-1727-42D1-B2C4-F4FCDE24444F}" type="datetime1">
               <a:rPr lang="en-GB" noProof="0" smtClean="0"/>
-              <a:t>09/12/2022</a:t>
+              <a:t>11/12/2022</a:t>
             </a:fld>
             <a:endParaRPr lang="en-GB" noProof="0"/>
           </a:p>
@@ -2072,7 +2074,7 @@
             <a:pPr rtl="0"/>
             <a:fld id="{5FF0FE9A-6841-4A36-9540-864C6A1F3EBE}" type="datetime1">
               <a:rPr lang="en-GB" noProof="0" smtClean="0"/>
-              <a:t>09/12/2022</a:t>
+              <a:t>11/12/2022</a:t>
             </a:fld>
             <a:endParaRPr lang="en-GB" noProof="0"/>
           </a:p>
@@ -2343,7 +2345,7 @@
             <a:pPr rtl="0"/>
             <a:fld id="{9777120A-BC0F-4DD5-9E46-BB9C1EFA7416}" type="datetime1">
               <a:rPr lang="en-GB" noProof="0" smtClean="0"/>
-              <a:t>09/12/2022</a:t>
+              <a:t>11/12/2022</a:t>
             </a:fld>
             <a:endParaRPr lang="en-GB" noProof="0"/>
           </a:p>
@@ -3375,7 +3377,7 @@
             <a:pPr rtl="0"/>
             <a:fld id="{8E899421-673F-4CCD-A44F-8F8B5E53A971}" type="datetime1">
               <a:rPr lang="en-GB" noProof="0" smtClean="0"/>
-              <a:t>09/12/2022</a:t>
+              <a:t>11/12/2022</a:t>
             </a:fld>
             <a:endParaRPr lang="en-GB" noProof="0"/>
           </a:p>
@@ -3649,7 +3651,7 @@
             <a:pPr rtl="0"/>
             <a:fld id="{CCDFEFAA-F37E-4197-82A3-46DA1629A2E1}" type="datetime1">
               <a:rPr lang="en-GB" noProof="0" smtClean="0"/>
-              <a:t>09/12/2022</a:t>
+              <a:t>11/12/2022</a:t>
             </a:fld>
             <a:endParaRPr lang="en-GB" noProof="0"/>
           </a:p>
@@ -4030,7 +4032,7 @@
             <a:pPr rtl="0"/>
             <a:fld id="{6818E844-891C-40D1-97EA-9B7B72C7EA69}" type="datetime1">
               <a:rPr lang="en-GB" noProof="0" smtClean="0"/>
-              <a:t>09/12/2022</a:t>
+              <a:t>11/12/2022</a:t>
             </a:fld>
             <a:endParaRPr lang="en-GB" noProof="0"/>
           </a:p>
@@ -4163,7 +4165,7 @@
             <a:pPr rtl="0"/>
             <a:fld id="{64E1ADA3-2D10-4D19-9D01-17EEDB2CF09C}" type="datetime1">
               <a:rPr lang="en-GB" noProof="0" smtClean="0"/>
-              <a:t>09/12/2022</a:t>
+              <a:t>11/12/2022</a:t>
             </a:fld>
             <a:endParaRPr lang="en-GB" noProof="0"/>
           </a:p>
@@ -4273,7 +4275,7 @@
             <a:pPr rtl="0"/>
             <a:fld id="{7B1607E5-5283-43B8-A7FC-26C1F3C9FF56}" type="datetime1">
               <a:rPr lang="en-GB" noProof="0" smtClean="0"/>
-              <a:t>09/12/2022</a:t>
+              <a:t>11/12/2022</a:t>
             </a:fld>
             <a:endParaRPr lang="en-GB" noProof="0"/>
           </a:p>
@@ -4566,7 +4568,7 @@
             <a:pPr rtl="0"/>
             <a:fld id="{C181A209-F933-43E2-BD0A-1CB83143268B}" type="datetime1">
               <a:rPr lang="en-GB" noProof="0" smtClean="0"/>
-              <a:t>09/12/2022</a:t>
+              <a:t>11/12/2022</a:t>
             </a:fld>
             <a:endParaRPr lang="en-GB" noProof="0"/>
           </a:p>
@@ -4821,7 +4823,7 @@
             <a:pPr rtl="0"/>
             <a:fld id="{6BC1B948-4E86-4900-BCE2-2386EC9BC47E}" type="datetime1">
               <a:rPr lang="en-GB" noProof="0" smtClean="0"/>
-              <a:t>09/12/2022</a:t>
+              <a:t>11/12/2022</a:t>
             </a:fld>
             <a:endParaRPr lang="en-GB" noProof="0"/>
           </a:p>
@@ -5918,6 +5920,255 @@
           <p:cNvPr id="2" name="Title 1">
             <a:extLst>
               <a:ext uri="{FF2B5EF4-FFF2-40B4-BE49-F238E27FC236}">
+                <a16:creationId xmlns:a16="http://schemas.microsoft.com/office/drawing/2014/main" id="{AC0C6F24-1D1E-8A5C-D586-8CA2C1FB5F84}"/>
+              </a:ext>
+            </a:extLst>
+          </p:cNvPr>
+          <p:cNvSpPr>
+            <a:spLocks noGrp="1"/>
+          </p:cNvSpPr>
+          <p:nvPr>
+            <p:ph type="title"/>
+          </p:nvPr>
+        </p:nvSpPr>
+        <p:spPr/>
+        <p:txBody>
+          <a:bodyPr/>
+          <a:lstStyle/>
+          <a:p>
+            <a:r>
+              <a:rPr lang="en-IT" dirty="0"/>
+              <a:t>Confussion Matrix for the two classifiers</a:t>
+            </a:r>
+          </a:p>
+        </p:txBody>
+      </p:sp>
+      <p:sp>
+        <p:nvSpPr>
+          <p:cNvPr id="3" name="Text Placeholder 2">
+            <a:extLst>
+              <a:ext uri="{FF2B5EF4-FFF2-40B4-BE49-F238E27FC236}">
+                <a16:creationId xmlns:a16="http://schemas.microsoft.com/office/drawing/2014/main" id="{24CD29A3-A148-5B1A-8EAF-538ECB9F398D}"/>
+              </a:ext>
+            </a:extLst>
+          </p:cNvPr>
+          <p:cNvSpPr>
+            <a:spLocks noGrp="1"/>
+          </p:cNvSpPr>
+          <p:nvPr>
+            <p:ph type="body" sz="half" idx="2"/>
+          </p:nvPr>
+        </p:nvSpPr>
+        <p:spPr>
+          <a:xfrm>
+            <a:off x="10238014" y="8273143"/>
+            <a:ext cx="12001500" cy="4572000"/>
+          </a:xfrm>
+        </p:spPr>
+        <p:txBody>
+          <a:bodyPr/>
+          <a:lstStyle/>
+          <a:p>
+            <a:endParaRPr lang="en-IT" dirty="0"/>
+          </a:p>
+        </p:txBody>
+      </p:sp>
+      <p:pic>
+        <p:nvPicPr>
+          <p:cNvPr id="6" name="Picture Placeholder 5">
+            <a:extLst>
+              <a:ext uri="{FF2B5EF4-FFF2-40B4-BE49-F238E27FC236}">
+                <a16:creationId xmlns:a16="http://schemas.microsoft.com/office/drawing/2014/main" id="{85EFB875-8511-58FE-8F39-82B533911A76}"/>
+              </a:ext>
+            </a:extLst>
+          </p:cNvPr>
+          <p:cNvPicPr>
+            <a:picLocks noGrp="1" noChangeAspect="1"/>
+          </p:cNvPicPr>
+          <p:nvPr>
+            <p:ph type="pic" idx="1"/>
+          </p:nvPr>
+        </p:nvPicPr>
+        <p:blipFill>
+          <a:blip r:embed="rId2">
+            <a:extLst>
+              <a:ext uri="{28A0092B-C50C-407E-A947-70E740481C1C}">
+                <a14:useLocalDpi xmlns:a14="http://schemas.microsoft.com/office/drawing/2010/main" val="0"/>
+              </a:ext>
+            </a:extLst>
+          </a:blip>
+          <a:srcRect l="449" r="449"/>
+          <a:stretch>
+            <a:fillRect/>
+          </a:stretch>
+        </p:blipFill>
+        <p:spPr>
+          <a:xfrm>
+            <a:off x="11991975" y="7913688"/>
+            <a:ext cx="6430963" cy="4572000"/>
+          </a:xfrm>
+        </p:spPr>
+      </p:pic>
+      <p:pic>
+        <p:nvPicPr>
+          <p:cNvPr id="8" name="Picture 7">
+            <a:extLst>
+              <a:ext uri="{FF2B5EF4-FFF2-40B4-BE49-F238E27FC236}">
+                <a16:creationId xmlns:a16="http://schemas.microsoft.com/office/drawing/2014/main" id="{1B65A174-6839-4D17-8566-0EA5040A98A9}"/>
+              </a:ext>
+            </a:extLst>
+          </p:cNvPr>
+          <p:cNvPicPr>
+            <a:picLocks noChangeAspect="1"/>
+          </p:cNvPicPr>
+          <p:nvPr/>
+        </p:nvPicPr>
+        <p:blipFill>
+          <a:blip r:embed="rId2">
+            <a:extLst>
+              <a:ext uri="{28A0092B-C50C-407E-A947-70E740481C1C}">
+                <a14:useLocalDpi xmlns:a14="http://schemas.microsoft.com/office/drawing/2010/main" val="0"/>
+              </a:ext>
+            </a:extLst>
+          </a:blip>
+          <a:stretch>
+            <a:fillRect/>
+          </a:stretch>
+        </p:blipFill>
+        <p:spPr>
+          <a:xfrm>
+            <a:off x="993349" y="2180771"/>
+            <a:ext cx="4892719" cy="3447143"/>
+          </a:xfrm>
+          <a:prstGeom prst="rect">
+            <a:avLst/>
+          </a:prstGeom>
+        </p:spPr>
+      </p:pic>
+      <p:pic>
+        <p:nvPicPr>
+          <p:cNvPr id="9" name="Picture 8">
+            <a:extLst>
+              <a:ext uri="{FF2B5EF4-FFF2-40B4-BE49-F238E27FC236}">
+                <a16:creationId xmlns:a16="http://schemas.microsoft.com/office/drawing/2014/main" id="{EEDEC80F-E750-C0C2-1FBD-A83FDFCE6EE3}"/>
+              </a:ext>
+            </a:extLst>
+          </p:cNvPr>
+          <p:cNvPicPr>
+            <a:picLocks noChangeAspect="1"/>
+          </p:cNvPicPr>
+          <p:nvPr/>
+        </p:nvPicPr>
+        <p:blipFill>
+          <a:blip r:embed="rId2">
+            <a:extLst>
+              <a:ext uri="{28A0092B-C50C-407E-A947-70E740481C1C}">
+                <a14:useLocalDpi xmlns:a14="http://schemas.microsoft.com/office/drawing/2010/main" val="0"/>
+              </a:ext>
+            </a:extLst>
+          </a:blip>
+          <a:stretch>
+            <a:fillRect/>
+          </a:stretch>
+        </p:blipFill>
+        <p:spPr>
+          <a:xfrm>
+            <a:off x="6095241" y="2180771"/>
+            <a:ext cx="5016325" cy="3534229"/>
+          </a:xfrm>
+          <a:prstGeom prst="rect">
+            <a:avLst/>
+          </a:prstGeom>
+        </p:spPr>
+      </p:pic>
+      <p:sp>
+        <p:nvSpPr>
+          <p:cNvPr id="11" name="TextBox 10">
+            <a:extLst>
+              <a:ext uri="{FF2B5EF4-FFF2-40B4-BE49-F238E27FC236}">
+                <a16:creationId xmlns:a16="http://schemas.microsoft.com/office/drawing/2014/main" id="{E7675C77-10A8-120F-CB1F-0537BE4D00F0}"/>
+              </a:ext>
+            </a:extLst>
+          </p:cNvPr>
+          <p:cNvSpPr txBox="1"/>
+          <p:nvPr/>
+        </p:nvSpPr>
+        <p:spPr>
+          <a:xfrm>
+            <a:off x="2594516" y="1447811"/>
+            <a:ext cx="7175619" cy="646331"/>
+          </a:xfrm>
+          <a:prstGeom prst="rect">
+            <a:avLst/>
+          </a:prstGeom>
+          <a:noFill/>
+        </p:spPr>
+        <p:txBody>
+          <a:bodyPr wrap="none" rtlCol="0">
+            <a:spAutoFit/>
+          </a:bodyPr>
+          <a:lstStyle/>
+          <a:p>
+            <a:r>
+              <a:rPr lang="en-IT" dirty="0"/>
+              <a:t>As we can see from this confussion matrix between two classifiers </a:t>
+            </a:r>
+          </a:p>
+          <a:p>
+            <a:r>
+              <a:rPr lang="en-IT" dirty="0"/>
+              <a:t>they perform exactly the same.</a:t>
+            </a:r>
+          </a:p>
+        </p:txBody>
+      </p:sp>
+    </p:spTree>
+    <p:extLst>
+      <p:ext uri="{BB962C8B-B14F-4D97-AF65-F5344CB8AC3E}">
+        <p14:creationId xmlns:p14="http://schemas.microsoft.com/office/powerpoint/2010/main" val="2103376028"/>
+      </p:ext>
+    </p:extLst>
+  </p:cSld>
+  <p:clrMapOvr>
+    <a:masterClrMapping/>
+  </p:clrMapOvr>
+  <mc:AlternateContent xmlns:mc="http://schemas.openxmlformats.org/markup-compatibility/2006" xmlns:p14="http://schemas.microsoft.com/office/powerpoint/2010/main">
+    <mc:Choice Requires="p14">
+      <p:transition spd="med" p14:dur="700">
+        <p:fade/>
+      </p:transition>
+    </mc:Choice>
+    <mc:Fallback xmlns="">
+      <p:transition spd="med">
+        <p:fade/>
+      </p:transition>
+    </mc:Fallback>
+  </mc:AlternateContent>
+</p:sld>
+</file>
+
+<file path=ppt/slides/slide13.xml><?xml version="1.0" encoding="utf-8"?>
+<p:sld xmlns:a="http://schemas.openxmlformats.org/drawingml/2006/main" xmlns:r="http://schemas.openxmlformats.org/officeDocument/2006/relationships" xmlns:p="http://schemas.openxmlformats.org/presentationml/2006/main">
+  <p:cSld>
+    <p:spTree>
+      <p:nvGrpSpPr>
+        <p:cNvPr id="1" name=""/>
+        <p:cNvGrpSpPr/>
+        <p:nvPr/>
+      </p:nvGrpSpPr>
+      <p:grpSpPr>
+        <a:xfrm>
+          <a:off x="0" y="0"/>
+          <a:ext cx="0" cy="0"/>
+          <a:chOff x="0" y="0"/>
+          <a:chExt cx="0" cy="0"/>
+        </a:xfrm>
+      </p:grpSpPr>
+      <p:sp>
+        <p:nvSpPr>
+          <p:cNvPr id="2" name="Title 1">
+            <a:extLst>
+              <a:ext uri="{FF2B5EF4-FFF2-40B4-BE49-F238E27FC236}">
                 <a16:creationId xmlns:a16="http://schemas.microsoft.com/office/drawing/2014/main" id="{9F84CD4F-4E64-3758-BBE4-D912D0A7B2C3}"/>
               </a:ext>
             </a:extLst>
@@ -6142,7 +6393,223 @@
 </p:sld>
 </file>
 
-<file path=ppt/slides/slide13.xml><?xml version="1.0" encoding="utf-8"?>
+<file path=ppt/slides/slide14.xml><?xml version="1.0" encoding="utf-8"?>
+<p:sld xmlns:a="http://schemas.openxmlformats.org/drawingml/2006/main" xmlns:r="http://schemas.openxmlformats.org/officeDocument/2006/relationships" xmlns:p="http://schemas.openxmlformats.org/presentationml/2006/main">
+  <p:cSld>
+    <p:spTree>
+      <p:nvGrpSpPr>
+        <p:cNvPr id="1" name=""/>
+        <p:cNvGrpSpPr/>
+        <p:nvPr/>
+      </p:nvGrpSpPr>
+      <p:grpSpPr>
+        <a:xfrm>
+          <a:off x="0" y="0"/>
+          <a:ext cx="0" cy="0"/>
+          <a:chOff x="0" y="0"/>
+          <a:chExt cx="0" cy="0"/>
+        </a:xfrm>
+      </p:grpSpPr>
+      <p:sp>
+        <p:nvSpPr>
+          <p:cNvPr id="2" name="Title 1">
+            <a:extLst>
+              <a:ext uri="{FF2B5EF4-FFF2-40B4-BE49-F238E27FC236}">
+                <a16:creationId xmlns:a16="http://schemas.microsoft.com/office/drawing/2014/main" id="{A22D9D55-270E-AFAA-9584-1BC6482B958F}"/>
+              </a:ext>
+            </a:extLst>
+          </p:cNvPr>
+          <p:cNvSpPr>
+            <a:spLocks noGrp="1"/>
+          </p:cNvSpPr>
+          <p:nvPr>
+            <p:ph type="title"/>
+          </p:nvPr>
+        </p:nvSpPr>
+        <p:spPr/>
+        <p:txBody>
+          <a:bodyPr/>
+          <a:lstStyle/>
+          <a:p>
+            <a:pPr algn="ctr"/>
+            <a:r>
+              <a:rPr lang="en-IT" dirty="0"/>
+              <a:t>Feature visualization</a:t>
+            </a:r>
+          </a:p>
+        </p:txBody>
+      </p:sp>
+      <p:sp>
+        <p:nvSpPr>
+          <p:cNvPr id="3" name="Text Placeholder 2">
+            <a:extLst>
+              <a:ext uri="{FF2B5EF4-FFF2-40B4-BE49-F238E27FC236}">
+                <a16:creationId xmlns:a16="http://schemas.microsoft.com/office/drawing/2014/main" id="{85EAABC1-225C-C643-33FF-42349C86AC99}"/>
+              </a:ext>
+            </a:extLst>
+          </p:cNvPr>
+          <p:cNvSpPr>
+            <a:spLocks noGrp="1"/>
+          </p:cNvSpPr>
+          <p:nvPr>
+            <p:ph type="body" sz="half" idx="2"/>
+          </p:nvPr>
+        </p:nvSpPr>
+        <p:spPr>
+          <a:xfrm>
+            <a:off x="7807452" y="10255691"/>
+            <a:ext cx="4384548" cy="4572000"/>
+          </a:xfrm>
+        </p:spPr>
+        <p:txBody>
+          <a:bodyPr/>
+          <a:lstStyle/>
+          <a:p>
+            <a:endParaRPr lang="en-IT" dirty="0"/>
+          </a:p>
+        </p:txBody>
+      </p:sp>
+      <p:pic>
+        <p:nvPicPr>
+          <p:cNvPr id="6" name="Content Placeholder 5">
+            <a:extLst>
+              <a:ext uri="{FF2B5EF4-FFF2-40B4-BE49-F238E27FC236}">
+                <a16:creationId xmlns:a16="http://schemas.microsoft.com/office/drawing/2014/main" id="{1DEDA550-B2EF-0EE4-2B28-90764168EEEC}"/>
+              </a:ext>
+            </a:extLst>
+          </p:cNvPr>
+          <p:cNvPicPr>
+            <a:picLocks noGrp="1" noChangeAspect="1"/>
+          </p:cNvPicPr>
+          <p:nvPr>
+            <p:ph idx="1"/>
+          </p:nvPr>
+        </p:nvPicPr>
+        <p:blipFill>
+          <a:blip r:embed="rId2">
+            <a:extLst>
+              <a:ext uri="{28A0092B-C50C-407E-A947-70E740481C1C}">
+                <a14:useLocalDpi xmlns:a14="http://schemas.microsoft.com/office/drawing/2010/main" val="0"/>
+              </a:ext>
+            </a:extLst>
+          </a:blip>
+          <a:stretch>
+            <a:fillRect/>
+          </a:stretch>
+        </p:blipFill>
+        <p:spPr>
+          <a:xfrm>
+            <a:off x="612776" y="2454150"/>
+            <a:ext cx="4908793" cy="3509723"/>
+          </a:xfrm>
+        </p:spPr>
+      </p:pic>
+      <p:pic>
+        <p:nvPicPr>
+          <p:cNvPr id="8" name="Picture 7">
+            <a:extLst>
+              <a:ext uri="{FF2B5EF4-FFF2-40B4-BE49-F238E27FC236}">
+                <a16:creationId xmlns:a16="http://schemas.microsoft.com/office/drawing/2014/main" id="{9A9A8E39-7916-43B3-DE96-61B1CDD6F46F}"/>
+              </a:ext>
+            </a:extLst>
+          </p:cNvPr>
+          <p:cNvPicPr>
+            <a:picLocks noChangeAspect="1"/>
+          </p:cNvPicPr>
+          <p:nvPr/>
+        </p:nvPicPr>
+        <p:blipFill>
+          <a:blip r:embed="rId3">
+            <a:extLst>
+              <a:ext uri="{28A0092B-C50C-407E-A947-70E740481C1C}">
+                <a14:useLocalDpi xmlns:a14="http://schemas.microsoft.com/office/drawing/2010/main" val="0"/>
+              </a:ext>
+            </a:extLst>
+          </a:blip>
+          <a:stretch>
+            <a:fillRect/>
+          </a:stretch>
+        </p:blipFill>
+        <p:spPr>
+          <a:xfrm>
+            <a:off x="5811715" y="2454150"/>
+            <a:ext cx="6121088" cy="3903379"/>
+          </a:xfrm>
+          <a:prstGeom prst="rect">
+            <a:avLst/>
+          </a:prstGeom>
+        </p:spPr>
+      </p:pic>
+      <p:sp>
+        <p:nvSpPr>
+          <p:cNvPr id="10" name="TextBox 9">
+            <a:extLst>
+              <a:ext uri="{FF2B5EF4-FFF2-40B4-BE49-F238E27FC236}">
+                <a16:creationId xmlns:a16="http://schemas.microsoft.com/office/drawing/2014/main" id="{8B34CE26-8EA1-0470-084B-A84B16509389}"/>
+              </a:ext>
+            </a:extLst>
+          </p:cNvPr>
+          <p:cNvSpPr txBox="1"/>
+          <p:nvPr/>
+        </p:nvSpPr>
+        <p:spPr>
+          <a:xfrm>
+            <a:off x="1003610" y="1594624"/>
+            <a:ext cx="8709102" cy="923330"/>
+          </a:xfrm>
+          <a:prstGeom prst="rect">
+            <a:avLst/>
+          </a:prstGeom>
+          <a:noFill/>
+        </p:spPr>
+        <p:txBody>
+          <a:bodyPr wrap="square" rtlCol="0">
+            <a:spAutoFit/>
+          </a:bodyPr>
+          <a:lstStyle/>
+          <a:p>
+            <a:r>
+              <a:rPr lang="en-IT" dirty="0"/>
+              <a:t>•House price unit area and house age relationship</a:t>
+            </a:r>
+          </a:p>
+          <a:p>
+            <a:r>
+              <a:rPr lang="en-IT" dirty="0"/>
+              <a:t>•Dynamic map to express the House price and location</a:t>
+            </a:r>
+          </a:p>
+          <a:p>
+            <a:endParaRPr lang="en-IT" dirty="0"/>
+          </a:p>
+        </p:txBody>
+      </p:sp>
+    </p:spTree>
+    <p:extLst>
+      <p:ext uri="{BB962C8B-B14F-4D97-AF65-F5344CB8AC3E}">
+        <p14:creationId xmlns:p14="http://schemas.microsoft.com/office/powerpoint/2010/main" val="734998518"/>
+      </p:ext>
+    </p:extLst>
+  </p:cSld>
+  <p:clrMapOvr>
+    <a:masterClrMapping/>
+  </p:clrMapOvr>
+  <mc:AlternateContent xmlns:mc="http://schemas.openxmlformats.org/markup-compatibility/2006" xmlns:p14="http://schemas.microsoft.com/office/powerpoint/2010/main">
+    <mc:Choice Requires="p14">
+      <p:transition spd="med" p14:dur="700">
+        <p:fade/>
+      </p:transition>
+    </mc:Choice>
+    <mc:Fallback xmlns="">
+      <p:transition spd="med">
+        <p:fade/>
+      </p:transition>
+    </mc:Fallback>
+  </mc:AlternateContent>
+</p:sld>
+</file>
+
+<file path=ppt/slides/slide15.xml><?xml version="1.0" encoding="utf-8"?>
 <p:sld xmlns:a="http://schemas.openxmlformats.org/drawingml/2006/main" xmlns:r="http://schemas.openxmlformats.org/officeDocument/2006/relationships" xmlns:p="http://schemas.openxmlformats.org/presentationml/2006/main">
   <p:cSld>
     <p:spTree>
@@ -6559,7 +7026,7 @@
 </p:sld>
 </file>
 
-<file path=ppt/slides/slide14.xml><?xml version="1.0" encoding="utf-8"?>
+<file path=ppt/slides/slide16.xml><?xml version="1.0" encoding="utf-8"?>
 <p:sld xmlns:a="http://schemas.openxmlformats.org/drawingml/2006/main" xmlns:r="http://schemas.openxmlformats.org/officeDocument/2006/relationships" xmlns:p="http://schemas.openxmlformats.org/presentationml/2006/main">
   <p:cSld>
     <p:spTree>
@@ -7772,6 +8239,325 @@
 </file>
 
 <file path=ppt/slides/slide8.xml><?xml version="1.0" encoding="utf-8"?>
+<p:sld xmlns:a="http://schemas.openxmlformats.org/drawingml/2006/main" xmlns:r="http://schemas.openxmlformats.org/officeDocument/2006/relationships" xmlns:p="http://schemas.openxmlformats.org/presentationml/2006/main">
+  <p:cSld>
+    <p:spTree>
+      <p:nvGrpSpPr>
+        <p:cNvPr id="1" name=""/>
+        <p:cNvGrpSpPr/>
+        <p:nvPr/>
+      </p:nvGrpSpPr>
+      <p:grpSpPr>
+        <a:xfrm>
+          <a:off x="0" y="0"/>
+          <a:ext cx="0" cy="0"/>
+          <a:chOff x="0" y="0"/>
+          <a:chExt cx="0" cy="0"/>
+        </a:xfrm>
+      </p:grpSpPr>
+      <p:sp>
+        <p:nvSpPr>
+          <p:cNvPr id="2" name="Title 1">
+            <a:extLst>
+              <a:ext uri="{FF2B5EF4-FFF2-40B4-BE49-F238E27FC236}">
+                <a16:creationId xmlns:a16="http://schemas.microsoft.com/office/drawing/2014/main" id="{AF6EFD68-B79F-87A8-7EB5-2E6592440DA0}"/>
+              </a:ext>
+            </a:extLst>
+          </p:cNvPr>
+          <p:cNvSpPr>
+            <a:spLocks noGrp="1"/>
+          </p:cNvSpPr>
+          <p:nvPr>
+            <p:ph type="title"/>
+          </p:nvPr>
+        </p:nvSpPr>
+        <p:spPr/>
+        <p:txBody>
+          <a:bodyPr/>
+          <a:lstStyle/>
+          <a:p>
+            <a:r>
+              <a:rPr lang="en-IT" dirty="0"/>
+              <a:t>Feature influence on Wine Quality</a:t>
+            </a:r>
+          </a:p>
+        </p:txBody>
+      </p:sp>
+      <p:pic>
+        <p:nvPicPr>
+          <p:cNvPr id="14" name="Content Placeholder 13">
+            <a:extLst>
+              <a:ext uri="{FF2B5EF4-FFF2-40B4-BE49-F238E27FC236}">
+                <a16:creationId xmlns:a16="http://schemas.microsoft.com/office/drawing/2014/main" id="{0C7206C0-B288-7BF7-5151-9095356AE60D}"/>
+              </a:ext>
+            </a:extLst>
+          </p:cNvPr>
+          <p:cNvPicPr>
+            <a:picLocks noGrp="1" noChangeAspect="1"/>
+          </p:cNvPicPr>
+          <p:nvPr>
+            <p:ph sz="half" idx="1"/>
+          </p:nvPr>
+        </p:nvPicPr>
+        <p:blipFill>
+          <a:blip r:embed="rId2">
+            <a:extLst>
+              <a:ext uri="{28A0092B-C50C-407E-A947-70E740481C1C}">
+                <a14:useLocalDpi xmlns:a14="http://schemas.microsoft.com/office/drawing/2010/main" val="0"/>
+              </a:ext>
+            </a:extLst>
+          </a:blip>
+          <a:stretch>
+            <a:fillRect/>
+          </a:stretch>
+        </p:blipFill>
+        <p:spPr>
+          <a:xfrm>
+            <a:off x="8434388" y="8337928"/>
+            <a:ext cx="4914900" cy="2685293"/>
+          </a:xfrm>
+        </p:spPr>
+      </p:pic>
+      <p:pic>
+        <p:nvPicPr>
+          <p:cNvPr id="18" name="Content Placeholder 17">
+            <a:extLst>
+              <a:ext uri="{FF2B5EF4-FFF2-40B4-BE49-F238E27FC236}">
+                <a16:creationId xmlns:a16="http://schemas.microsoft.com/office/drawing/2014/main" id="{FD9BCEED-E0DA-28EE-BE6A-305817A904AF}"/>
+              </a:ext>
+            </a:extLst>
+          </p:cNvPr>
+          <p:cNvPicPr>
+            <a:picLocks noGrp="1" noChangeAspect="1"/>
+          </p:cNvPicPr>
+          <p:nvPr>
+            <p:ph sz="half" idx="2"/>
+          </p:nvPr>
+        </p:nvPicPr>
+        <p:blipFill>
+          <a:blip r:embed="rId3">
+            <a:extLst>
+              <a:ext uri="{28A0092B-C50C-407E-A947-70E740481C1C}">
+                <a14:useLocalDpi xmlns:a14="http://schemas.microsoft.com/office/drawing/2010/main" val="0"/>
+              </a:ext>
+            </a:extLst>
+          </a:blip>
+          <a:stretch>
+            <a:fillRect/>
+          </a:stretch>
+        </p:blipFill>
+        <p:spPr>
+          <a:xfrm>
+            <a:off x="11447463" y="8721405"/>
+            <a:ext cx="4914900" cy="3026416"/>
+          </a:xfrm>
+        </p:spPr>
+      </p:pic>
+      <p:pic>
+        <p:nvPicPr>
+          <p:cNvPr id="24" name="Picture 23">
+            <a:extLst>
+              <a:ext uri="{FF2B5EF4-FFF2-40B4-BE49-F238E27FC236}">
+                <a16:creationId xmlns:a16="http://schemas.microsoft.com/office/drawing/2014/main" id="{E4A3E2E6-6CA2-F466-1442-C2E3790DB37D}"/>
+              </a:ext>
+            </a:extLst>
+          </p:cNvPr>
+          <p:cNvPicPr>
+            <a:picLocks noChangeAspect="1"/>
+          </p:cNvPicPr>
+          <p:nvPr/>
+        </p:nvPicPr>
+        <p:blipFill>
+          <a:blip r:embed="rId4">
+            <a:extLst>
+              <a:ext uri="{28A0092B-C50C-407E-A947-70E740481C1C}">
+                <a14:useLocalDpi xmlns:a14="http://schemas.microsoft.com/office/drawing/2010/main" val="0"/>
+              </a:ext>
+            </a:extLst>
+          </a:blip>
+          <a:stretch>
+            <a:fillRect/>
+          </a:stretch>
+        </p:blipFill>
+        <p:spPr>
+          <a:xfrm>
+            <a:off x="391745" y="2396392"/>
+            <a:ext cx="3696677" cy="2817446"/>
+          </a:xfrm>
+          <a:prstGeom prst="rect">
+            <a:avLst/>
+          </a:prstGeom>
+        </p:spPr>
+      </p:pic>
+      <p:pic>
+        <p:nvPicPr>
+          <p:cNvPr id="26" name="Picture 25">
+            <a:extLst>
+              <a:ext uri="{FF2B5EF4-FFF2-40B4-BE49-F238E27FC236}">
+                <a16:creationId xmlns:a16="http://schemas.microsoft.com/office/drawing/2014/main" id="{B9B70B94-85B8-BA07-2186-36D0AE385673}"/>
+              </a:ext>
+            </a:extLst>
+          </p:cNvPr>
+          <p:cNvPicPr>
+            <a:picLocks noChangeAspect="1"/>
+          </p:cNvPicPr>
+          <p:nvPr/>
+        </p:nvPicPr>
+        <p:blipFill>
+          <a:blip r:embed="rId5">
+            <a:extLst>
+              <a:ext uri="{28A0092B-C50C-407E-A947-70E740481C1C}">
+                <a14:useLocalDpi xmlns:a14="http://schemas.microsoft.com/office/drawing/2010/main" val="0"/>
+              </a:ext>
+            </a:extLst>
+          </a:blip>
+          <a:stretch>
+            <a:fillRect/>
+          </a:stretch>
+        </p:blipFill>
+        <p:spPr>
+          <a:xfrm>
+            <a:off x="4028345" y="2396392"/>
+            <a:ext cx="4075235" cy="2685293"/>
+          </a:xfrm>
+          <a:prstGeom prst="rect">
+            <a:avLst/>
+          </a:prstGeom>
+        </p:spPr>
+      </p:pic>
+      <p:pic>
+        <p:nvPicPr>
+          <p:cNvPr id="28" name="Picture 27">
+            <a:extLst>
+              <a:ext uri="{FF2B5EF4-FFF2-40B4-BE49-F238E27FC236}">
+                <a16:creationId xmlns:a16="http://schemas.microsoft.com/office/drawing/2014/main" id="{4A2753C9-BD9F-46B8-5F6E-DF7D1BC19F72}"/>
+              </a:ext>
+            </a:extLst>
+          </p:cNvPr>
+          <p:cNvPicPr>
+            <a:picLocks noChangeAspect="1"/>
+          </p:cNvPicPr>
+          <p:nvPr/>
+        </p:nvPicPr>
+        <p:blipFill>
+          <a:blip r:embed="rId3">
+            <a:extLst>
+              <a:ext uri="{28A0092B-C50C-407E-A947-70E740481C1C}">
+                <a14:useLocalDpi xmlns:a14="http://schemas.microsoft.com/office/drawing/2010/main" val="0"/>
+              </a:ext>
+            </a:extLst>
+          </a:blip>
+          <a:stretch>
+            <a:fillRect/>
+          </a:stretch>
+        </p:blipFill>
+        <p:spPr>
+          <a:xfrm>
+            <a:off x="7943850" y="2396392"/>
+            <a:ext cx="4360916" cy="2685293"/>
+          </a:xfrm>
+          <a:prstGeom prst="rect">
+            <a:avLst/>
+          </a:prstGeom>
+        </p:spPr>
+      </p:pic>
+      <p:sp>
+        <p:nvSpPr>
+          <p:cNvPr id="30" name="TextBox 29">
+            <a:extLst>
+              <a:ext uri="{FF2B5EF4-FFF2-40B4-BE49-F238E27FC236}">
+                <a16:creationId xmlns:a16="http://schemas.microsoft.com/office/drawing/2014/main" id="{EB2A5DFC-7BEA-EF7E-CFB6-F81C75B1CF3D}"/>
+              </a:ext>
+            </a:extLst>
+          </p:cNvPr>
+          <p:cNvSpPr txBox="1"/>
+          <p:nvPr/>
+        </p:nvSpPr>
+        <p:spPr>
+          <a:xfrm>
+            <a:off x="990600" y="1387076"/>
+            <a:ext cx="8044962" cy="1569660"/>
+          </a:xfrm>
+          <a:prstGeom prst="rect">
+            <a:avLst/>
+          </a:prstGeom>
+          <a:noFill/>
+        </p:spPr>
+        <p:txBody>
+          <a:bodyPr wrap="square" rtlCol="0">
+            <a:spAutoFit/>
+          </a:bodyPr>
+          <a:lstStyle/>
+          <a:p>
+            <a:r>
+              <a:rPr lang="en-IT" dirty="0"/>
+              <a:t>•</a:t>
+            </a:r>
+            <a:r>
+              <a:rPr lang="en-GB" sz="1400" dirty="0"/>
+              <a:t>Downing trend in the volatile acidity as we go higher the quality </a:t>
+            </a:r>
+            <a:endParaRPr lang="en-IT" sz="1400" dirty="0"/>
+          </a:p>
+          <a:p>
+            <a:r>
+              <a:rPr lang="en-IT" sz="1400" dirty="0"/>
+              <a:t>•</a:t>
+            </a:r>
+            <a:r>
+              <a:rPr lang="en-GB" sz="1400" dirty="0"/>
+              <a:t>Sulphates level goes higher with the quality of wine</a:t>
+            </a:r>
+            <a:endParaRPr lang="en-IT" sz="1400" dirty="0"/>
+          </a:p>
+          <a:p>
+            <a:r>
+              <a:rPr lang="en-IT" sz="1400" dirty="0"/>
+              <a:t>•</a:t>
+            </a:r>
+            <a:r>
+              <a:rPr lang="en-GB" sz="1400" dirty="0"/>
+              <a:t>Alcohol level also goes higher as the quality of wine increases</a:t>
+            </a:r>
+            <a:endParaRPr lang="en-IT" sz="1400" dirty="0"/>
+          </a:p>
+          <a:p>
+            <a:endParaRPr lang="en-IT" sz="1400" dirty="0"/>
+          </a:p>
+          <a:p>
+            <a:endParaRPr lang="en-IT" dirty="0"/>
+          </a:p>
+          <a:p>
+            <a:endParaRPr lang="en-IT" dirty="0"/>
+          </a:p>
+        </p:txBody>
+      </p:sp>
+    </p:spTree>
+    <p:extLst>
+      <p:ext uri="{BB962C8B-B14F-4D97-AF65-F5344CB8AC3E}">
+        <p14:creationId xmlns:p14="http://schemas.microsoft.com/office/powerpoint/2010/main" val="1814555783"/>
+      </p:ext>
+    </p:extLst>
+  </p:cSld>
+  <p:clrMapOvr>
+    <a:masterClrMapping/>
+  </p:clrMapOvr>
+  <mc:AlternateContent xmlns:mc="http://schemas.openxmlformats.org/markup-compatibility/2006" xmlns:p14="http://schemas.microsoft.com/office/powerpoint/2010/main">
+    <mc:Choice Requires="p14">
+      <p:transition spd="med" p14:dur="700">
+        <p:fade/>
+      </p:transition>
+    </mc:Choice>
+    <mc:Fallback xmlns="">
+      <p:transition spd="med">
+        <p:fade/>
+      </p:transition>
+    </mc:Fallback>
+  </mc:AlternateContent>
+</p:sld>
+</file>
+
+<file path=ppt/slides/slide9.xml><?xml version="1.0" encoding="utf-8"?>
 <p:sld xmlns:a="http://schemas.openxmlformats.org/drawingml/2006/main" xmlns:r="http://schemas.openxmlformats.org/officeDocument/2006/relationships" xmlns:p="http://schemas.openxmlformats.org/presentationml/2006/main">
   <p:cSld>
     <p:spTree>
@@ -8120,255 +8906,6 @@
     <p:extLst>
       <p:ext uri="{BB962C8B-B14F-4D97-AF65-F5344CB8AC3E}">
         <p14:creationId xmlns:p14="http://schemas.microsoft.com/office/powerpoint/2010/main" val="4049775625"/>
-      </p:ext>
-    </p:extLst>
-  </p:cSld>
-  <p:clrMapOvr>
-    <a:masterClrMapping/>
-  </p:clrMapOvr>
-  <mc:AlternateContent xmlns:mc="http://schemas.openxmlformats.org/markup-compatibility/2006" xmlns:p14="http://schemas.microsoft.com/office/powerpoint/2010/main">
-    <mc:Choice Requires="p14">
-      <p:transition spd="med" p14:dur="700">
-        <p:fade/>
-      </p:transition>
-    </mc:Choice>
-    <mc:Fallback xmlns="">
-      <p:transition spd="med">
-        <p:fade/>
-      </p:transition>
-    </mc:Fallback>
-  </mc:AlternateContent>
-</p:sld>
-</file>
-
-<file path=ppt/slides/slide9.xml><?xml version="1.0" encoding="utf-8"?>
-<p:sld xmlns:a="http://schemas.openxmlformats.org/drawingml/2006/main" xmlns:r="http://schemas.openxmlformats.org/officeDocument/2006/relationships" xmlns:p="http://schemas.openxmlformats.org/presentationml/2006/main">
-  <p:cSld>
-    <p:spTree>
-      <p:nvGrpSpPr>
-        <p:cNvPr id="1" name=""/>
-        <p:cNvGrpSpPr/>
-        <p:nvPr/>
-      </p:nvGrpSpPr>
-      <p:grpSpPr>
-        <a:xfrm>
-          <a:off x="0" y="0"/>
-          <a:ext cx="0" cy="0"/>
-          <a:chOff x="0" y="0"/>
-          <a:chExt cx="0" cy="0"/>
-        </a:xfrm>
-      </p:grpSpPr>
-      <p:sp>
-        <p:nvSpPr>
-          <p:cNvPr id="2" name="Title 1">
-            <a:extLst>
-              <a:ext uri="{FF2B5EF4-FFF2-40B4-BE49-F238E27FC236}">
-                <a16:creationId xmlns:a16="http://schemas.microsoft.com/office/drawing/2014/main" id="{AC0C6F24-1D1E-8A5C-D586-8CA2C1FB5F84}"/>
-              </a:ext>
-            </a:extLst>
-          </p:cNvPr>
-          <p:cNvSpPr>
-            <a:spLocks noGrp="1"/>
-          </p:cNvSpPr>
-          <p:nvPr>
-            <p:ph type="title"/>
-          </p:nvPr>
-        </p:nvSpPr>
-        <p:spPr/>
-        <p:txBody>
-          <a:bodyPr/>
-          <a:lstStyle/>
-          <a:p>
-            <a:r>
-              <a:rPr lang="en-IT" dirty="0"/>
-              <a:t>Confussion Matrix for the two classifiers</a:t>
-            </a:r>
-          </a:p>
-        </p:txBody>
-      </p:sp>
-      <p:sp>
-        <p:nvSpPr>
-          <p:cNvPr id="3" name="Text Placeholder 2">
-            <a:extLst>
-              <a:ext uri="{FF2B5EF4-FFF2-40B4-BE49-F238E27FC236}">
-                <a16:creationId xmlns:a16="http://schemas.microsoft.com/office/drawing/2014/main" id="{24CD29A3-A148-5B1A-8EAF-538ECB9F398D}"/>
-              </a:ext>
-            </a:extLst>
-          </p:cNvPr>
-          <p:cNvSpPr>
-            <a:spLocks noGrp="1"/>
-          </p:cNvSpPr>
-          <p:nvPr>
-            <p:ph type="body" sz="half" idx="2"/>
-          </p:nvPr>
-        </p:nvSpPr>
-        <p:spPr>
-          <a:xfrm>
-            <a:off x="10238014" y="8273143"/>
-            <a:ext cx="12001500" cy="4572000"/>
-          </a:xfrm>
-        </p:spPr>
-        <p:txBody>
-          <a:bodyPr/>
-          <a:lstStyle/>
-          <a:p>
-            <a:endParaRPr lang="en-IT" dirty="0"/>
-          </a:p>
-        </p:txBody>
-      </p:sp>
-      <p:pic>
-        <p:nvPicPr>
-          <p:cNvPr id="6" name="Picture Placeholder 5">
-            <a:extLst>
-              <a:ext uri="{FF2B5EF4-FFF2-40B4-BE49-F238E27FC236}">
-                <a16:creationId xmlns:a16="http://schemas.microsoft.com/office/drawing/2014/main" id="{85EFB875-8511-58FE-8F39-82B533911A76}"/>
-              </a:ext>
-            </a:extLst>
-          </p:cNvPr>
-          <p:cNvPicPr>
-            <a:picLocks noGrp="1" noChangeAspect="1"/>
-          </p:cNvPicPr>
-          <p:nvPr>
-            <p:ph type="pic" idx="1"/>
-          </p:nvPr>
-        </p:nvPicPr>
-        <p:blipFill>
-          <a:blip r:embed="rId2">
-            <a:extLst>
-              <a:ext uri="{28A0092B-C50C-407E-A947-70E740481C1C}">
-                <a14:useLocalDpi xmlns:a14="http://schemas.microsoft.com/office/drawing/2010/main" val="0"/>
-              </a:ext>
-            </a:extLst>
-          </a:blip>
-          <a:srcRect l="449" r="449"/>
-          <a:stretch>
-            <a:fillRect/>
-          </a:stretch>
-        </p:blipFill>
-        <p:spPr>
-          <a:xfrm>
-            <a:off x="11991975" y="7913688"/>
-            <a:ext cx="6430963" cy="4572000"/>
-          </a:xfrm>
-        </p:spPr>
-      </p:pic>
-      <p:pic>
-        <p:nvPicPr>
-          <p:cNvPr id="8" name="Picture 7">
-            <a:extLst>
-              <a:ext uri="{FF2B5EF4-FFF2-40B4-BE49-F238E27FC236}">
-                <a16:creationId xmlns:a16="http://schemas.microsoft.com/office/drawing/2014/main" id="{1B65A174-6839-4D17-8566-0EA5040A98A9}"/>
-              </a:ext>
-            </a:extLst>
-          </p:cNvPr>
-          <p:cNvPicPr>
-            <a:picLocks noChangeAspect="1"/>
-          </p:cNvPicPr>
-          <p:nvPr/>
-        </p:nvPicPr>
-        <p:blipFill>
-          <a:blip r:embed="rId2">
-            <a:extLst>
-              <a:ext uri="{28A0092B-C50C-407E-A947-70E740481C1C}">
-                <a14:useLocalDpi xmlns:a14="http://schemas.microsoft.com/office/drawing/2010/main" val="0"/>
-              </a:ext>
-            </a:extLst>
-          </a:blip>
-          <a:stretch>
-            <a:fillRect/>
-          </a:stretch>
-        </p:blipFill>
-        <p:spPr>
-          <a:xfrm>
-            <a:off x="993349" y="2180771"/>
-            <a:ext cx="4892719" cy="3447143"/>
-          </a:xfrm>
-          <a:prstGeom prst="rect">
-            <a:avLst/>
-          </a:prstGeom>
-        </p:spPr>
-      </p:pic>
-      <p:pic>
-        <p:nvPicPr>
-          <p:cNvPr id="9" name="Picture 8">
-            <a:extLst>
-              <a:ext uri="{FF2B5EF4-FFF2-40B4-BE49-F238E27FC236}">
-                <a16:creationId xmlns:a16="http://schemas.microsoft.com/office/drawing/2014/main" id="{EEDEC80F-E750-C0C2-1FBD-A83FDFCE6EE3}"/>
-              </a:ext>
-            </a:extLst>
-          </p:cNvPr>
-          <p:cNvPicPr>
-            <a:picLocks noChangeAspect="1"/>
-          </p:cNvPicPr>
-          <p:nvPr/>
-        </p:nvPicPr>
-        <p:blipFill>
-          <a:blip r:embed="rId2">
-            <a:extLst>
-              <a:ext uri="{28A0092B-C50C-407E-A947-70E740481C1C}">
-                <a14:useLocalDpi xmlns:a14="http://schemas.microsoft.com/office/drawing/2010/main" val="0"/>
-              </a:ext>
-            </a:extLst>
-          </a:blip>
-          <a:stretch>
-            <a:fillRect/>
-          </a:stretch>
-        </p:blipFill>
-        <p:spPr>
-          <a:xfrm>
-            <a:off x="6095241" y="2180771"/>
-            <a:ext cx="5016325" cy="3534229"/>
-          </a:xfrm>
-          <a:prstGeom prst="rect">
-            <a:avLst/>
-          </a:prstGeom>
-        </p:spPr>
-      </p:pic>
-      <p:sp>
-        <p:nvSpPr>
-          <p:cNvPr id="11" name="TextBox 10">
-            <a:extLst>
-              <a:ext uri="{FF2B5EF4-FFF2-40B4-BE49-F238E27FC236}">
-                <a16:creationId xmlns:a16="http://schemas.microsoft.com/office/drawing/2014/main" id="{E7675C77-10A8-120F-CB1F-0537BE4D00F0}"/>
-              </a:ext>
-            </a:extLst>
-          </p:cNvPr>
-          <p:cNvSpPr txBox="1"/>
-          <p:nvPr/>
-        </p:nvSpPr>
-        <p:spPr>
-          <a:xfrm>
-            <a:off x="2594516" y="1447811"/>
-            <a:ext cx="7175619" cy="646331"/>
-          </a:xfrm>
-          <a:prstGeom prst="rect">
-            <a:avLst/>
-          </a:prstGeom>
-          <a:noFill/>
-        </p:spPr>
-        <p:txBody>
-          <a:bodyPr wrap="none" rtlCol="0">
-            <a:spAutoFit/>
-          </a:bodyPr>
-          <a:lstStyle/>
-          <a:p>
-            <a:r>
-              <a:rPr lang="en-IT" dirty="0"/>
-              <a:t>As we can see from this confussion matrix between two classifiers </a:t>
-            </a:r>
-          </a:p>
-          <a:p>
-            <a:r>
-              <a:rPr lang="en-IT" dirty="0"/>
-              <a:t>they perform exactly the same.</a:t>
-            </a:r>
-          </a:p>
-        </p:txBody>
-      </p:sp>
-    </p:spTree>
-    <p:extLst>
-      <p:ext uri="{BB962C8B-B14F-4D97-AF65-F5344CB8AC3E}">
-        <p14:creationId xmlns:p14="http://schemas.microsoft.com/office/powerpoint/2010/main" val="2103376028"/>
       </p:ext>
     </p:extLst>
   </p:cSld>
@@ -9138,15 +9675,6 @@
 </file>
 
 <file path=customXml/item1.xml><?xml version="1.0" encoding="utf-8"?>
-<?mso-contentType ?>
-<FormTemplates xmlns="http://schemas.microsoft.com/sharepoint/v3/contenttype/forms">
-  <Display>DocumentLibraryForm</Display>
-  <Edit>AssetEditForm</Edit>
-  <New>DocumentLibraryForm</New>
-</FormTemplates>
-</file>
-
-<file path=customXml/item2.xml><?xml version="1.0" encoding="utf-8"?>
 <ct:contentTypeSchema xmlns:ct="http://schemas.microsoft.com/office/2006/metadata/contentType" xmlns:ma="http://schemas.microsoft.com/office/2006/metadata/properties/metaAttributes" ct:_="" ma:_="" ma:contentTypeName="TemplateFile" ma:contentTypeID="0x0101006EDDDB5EE6D98C44930B742096920B300400F5B6D36B3EF94B4E9A635CDF2A18F5B8" ma:contentTypeVersion="72" ma:contentTypeDescription="Create a new document." ma:contentTypeScope="" ma:versionID="a23e56308344d904b51738559c3d67c9">
   <xsd:schema xmlns:xsd="http://www.w3.org/2001/XMLSchema" xmlns:xs="http://www.w3.org/2001/XMLSchema" xmlns:p="http://schemas.microsoft.com/office/2006/metadata/properties" xmlns:ns2="4873beb7-5857-4685-be1f-d57550cc96cc" targetNamespace="http://schemas.microsoft.com/office/2006/metadata/properties" ma:root="true" ma:fieldsID="cd0908cc4600e77bf5da051303e00c8d" ns2:_="">
     <xsd:import namespace="4873beb7-5857-4685-be1f-d57550cc96cc"/>
@@ -10186,6 +10714,15 @@
 </ct:contentTypeSchema>
 </file>
 
+<file path=customXml/item2.xml><?xml version="1.0" encoding="utf-8"?>
+<?mso-contentType ?>
+<FormTemplates xmlns="http://schemas.microsoft.com/sharepoint/v3/contenttype/forms">
+  <Display>DocumentLibraryForm</Display>
+  <Edit>AssetEditForm</Edit>
+  <New>DocumentLibraryForm</New>
+</FormTemplates>
+</file>
+
 <file path=customXml/item3.xml><?xml version="1.0" encoding="utf-8"?>
 <p:properties xmlns:p="http://schemas.microsoft.com/office/2006/metadata/properties" xmlns:xsi="http://www.w3.org/2001/XMLSchema-instance" xmlns:pc="http://schemas.microsoft.com/office/infopath/2007/PartnerControls">
   <documentManagement>
@@ -10313,14 +10850,6 @@
 </file>
 
 <file path=customXml/itemProps1.xml><?xml version="1.0" encoding="utf-8"?>
-<ds:datastoreItem xmlns:ds="http://schemas.openxmlformats.org/officeDocument/2006/customXml" ds:itemID="{561E720F-F05D-4536-9C34-0CFCED65D3B7}">
-  <ds:schemaRefs>
-    <ds:schemaRef ds:uri="http://schemas.microsoft.com/sharepoint/v3/contenttype/forms"/>
-  </ds:schemaRefs>
-</ds:datastoreItem>
-</file>
-
-<file path=customXml/itemProps2.xml><?xml version="1.0" encoding="utf-8"?>
 <ds:datastoreItem xmlns:ds="http://schemas.openxmlformats.org/officeDocument/2006/customXml" ds:itemID="{28C8B9CA-0273-4370-889A-FC05DA5C2FA5}">
   <ds:schemaRefs>
     <ds:schemaRef ds:uri="http://schemas.microsoft.com/office/2006/metadata/contentType"/>
@@ -10334,6 +10863,14 @@
     <ds:schemaRef ds:uri="http://purl.org/dc/elements/1.1/"/>
     <ds:schemaRef ds:uri="http://purl.org/dc/terms/"/>
     <ds:schemaRef ds:uri="http://schemas.microsoft.com/internal/obd"/>
+  </ds:schemaRefs>
+</ds:datastoreItem>
+</file>
+
+<file path=customXml/itemProps2.xml><?xml version="1.0" encoding="utf-8"?>
+<ds:datastoreItem xmlns:ds="http://schemas.openxmlformats.org/officeDocument/2006/customXml" ds:itemID="{561E720F-F05D-4536-9C34-0CFCED65D3B7}">
+  <ds:schemaRefs>
+    <ds:schemaRef ds:uri="http://schemas.microsoft.com/sharepoint/v3/contenttype/forms"/>
   </ds:schemaRefs>
 </ds:datastoreItem>
 </file>

</xml_diff>